<commit_message>
[engineering] upload survy before training.
</commit_message>
<xml_diff>
--- a/engineering/2017/materials/ppt/demo.pptx
+++ b/engineering/2017/materials/ppt/demo.pptx
@@ -8,7 +8,7 @@
     <p:sldMasterId id="2147483652" r:id="rId7"/>
   </p:sldMasterIdLst>
   <p:notesMasterIdLst>
-    <p:notesMasterId r:id="rId22"/>
+    <p:notesMasterId r:id="rId23"/>
   </p:notesMasterIdLst>
   <p:sldIdLst>
     <p:sldId id="281" r:id="rId8"/>
@@ -23,8 +23,9 @@
     <p:sldId id="398" r:id="rId17"/>
     <p:sldId id="399" r:id="rId18"/>
     <p:sldId id="400" r:id="rId19"/>
-    <p:sldId id="264" r:id="rId20"/>
-    <p:sldId id="265" r:id="rId21"/>
+    <p:sldId id="405" r:id="rId20"/>
+    <p:sldId id="264" r:id="rId21"/>
+    <p:sldId id="265" r:id="rId22"/>
   </p:sldIdLst>
   <p:sldSz cx="12192000" cy="6858000"/>
   <p:notesSz cx="6858000" cy="9144000"/>
@@ -144,6 +145,7 @@
             <p14:sldId id="398"/>
             <p14:sldId id="399"/>
             <p14:sldId id="400"/>
+            <p14:sldId id="405"/>
           </p14:sldIdLst>
         </p14:section>
         <p14:section name="End - FAQ" id="{4609FC15-6DD3-4FCD-B0A4-05C247ADF4C3}">
@@ -255,7 +257,7 @@
             <a:fld id="{97373330-0875-4F54-B846-34A9C5D83194}" type="datetimeFigureOut">
               <a:rPr lang="en-US" smtClean="0"/>
               <a:pPr/>
-              <a:t>2017-08-28</a:t>
+              <a:t>2017-08-30</a:t>
             </a:fld>
             <a:endParaRPr lang="en-US"/>
           </a:p>
@@ -9382,6 +9384,112 @@
           <a:chExt cx="0" cy="0"/>
         </a:xfrm>
       </p:grpSpPr>
+      <p:sp>
+        <p:nvSpPr>
+          <p:cNvPr id="2" name="Text Placeholder 1"/>
+          <p:cNvSpPr>
+            <a:spLocks noGrp="1"/>
+          </p:cNvSpPr>
+          <p:nvPr>
+            <p:ph type="body" sz="quarter" idx="13"/>
+          </p:nvPr>
+        </p:nvSpPr>
+        <p:spPr/>
+        <p:txBody>
+          <a:bodyPr/>
+          <a:lstStyle/>
+          <a:p>
+            <a:r>
+              <a:rPr lang="en-US" dirty="0"/>
+              <a:t>O</a:t>
+            </a:r>
+          </a:p>
+        </p:txBody>
+      </p:sp>
+      <p:sp>
+        <p:nvSpPr>
+          <p:cNvPr id="3" name="Text Placeholder 2"/>
+          <p:cNvSpPr>
+            <a:spLocks noGrp="1"/>
+          </p:cNvSpPr>
+          <p:nvPr>
+            <p:ph type="body" sz="quarter" idx="14"/>
+          </p:nvPr>
+        </p:nvSpPr>
+        <p:spPr/>
+        <p:txBody>
+          <a:bodyPr/>
+          <a:lstStyle/>
+          <a:p>
+            <a:r>
+              <a:rPr lang="en-US" dirty="0"/>
+              <a:t>References</a:t>
+            </a:r>
+          </a:p>
+        </p:txBody>
+      </p:sp>
+      <p:sp>
+        <p:nvSpPr>
+          <p:cNvPr id="4" name="Content Placeholder 3"/>
+          <p:cNvSpPr>
+            <a:spLocks noGrp="1"/>
+          </p:cNvSpPr>
+          <p:nvPr>
+            <p:ph sz="quarter" idx="15"/>
+          </p:nvPr>
+        </p:nvSpPr>
+        <p:spPr/>
+        <p:txBody>
+          <a:bodyPr/>
+          <a:lstStyle/>
+          <a:p>
+            <a:r>
+              <a:rPr lang="en-US" dirty="0"/>
+              <a:t>@angular/cli: bundled webpack build flow</a:t>
+            </a:r>
+          </a:p>
+          <a:p>
+            <a:r>
+              <a:rPr lang="en-US" dirty="0" err="1"/>
+              <a:t>vue</a:t>
+            </a:r>
+            <a:r>
+              <a:rPr lang="en-US" dirty="0"/>
+              <a:t>-webpack-template</a:t>
+            </a:r>
+          </a:p>
+        </p:txBody>
+      </p:sp>
+    </p:spTree>
+    <p:extLst>
+      <p:ext uri="{BB962C8B-B14F-4D97-AF65-F5344CB8AC3E}">
+        <p14:creationId xmlns:p14="http://schemas.microsoft.com/office/powerpoint/2010/main" val="987558513"/>
+      </p:ext>
+    </p:extLst>
+  </p:cSld>
+  <p:clrMapOvr>
+    <a:masterClrMapping/>
+  </p:clrMapOvr>
+</p:sld>
+</file>
+
+<file path=ppt/slides/slide14.xml><?xml version="1.0" encoding="utf-8"?>
+<p:sld xmlns:a="http://schemas.openxmlformats.org/drawingml/2006/main" xmlns:r="http://schemas.openxmlformats.org/officeDocument/2006/relationships" xmlns:p="http://schemas.openxmlformats.org/presentationml/2006/main">
+  <p:cSld>
+    <p:spTree>
+      <p:nvGrpSpPr>
+        <p:cNvPr id="1" name=""/>
+        <p:cNvGrpSpPr/>
+        <p:nvPr/>
+      </p:nvGrpSpPr>
+      <p:grpSpPr>
+        <a:xfrm>
+          <a:off x="0" y="0"/>
+          <a:ext cx="0" cy="0"/>
+          <a:chOff x="0" y="0"/>
+          <a:chExt cx="0" cy="0"/>
+        </a:xfrm>
+      </p:grpSpPr>
     </p:spTree>
   </p:cSld>
   <p:clrMapOvr>
@@ -9390,7 +9498,7 @@
 </p:sld>
 </file>
 
-<file path=ppt/slides/slide14.xml><?xml version="1.0" encoding="utf-8"?>
+<file path=ppt/slides/slide15.xml><?xml version="1.0" encoding="utf-8"?>
 <p:sld xmlns:a="http://schemas.openxmlformats.org/drawingml/2006/main" xmlns:r="http://schemas.openxmlformats.org/officeDocument/2006/relationships" xmlns:p="http://schemas.openxmlformats.org/presentationml/2006/main">
   <p:cSld>
     <p:spTree>
@@ -12491,18 +12599,18 @@
 </file>
 
 <file path=customXml/item1.xml><?xml version="1.0" encoding="utf-8"?>
+<p:properties xmlns:p="http://schemas.microsoft.com/office/2006/metadata/properties" xmlns:xsi="http://www.w3.org/2001/XMLSchema-instance">
+  <documentManagement/>
+</p:properties>
+</file>
+
+<file path=customXml/item2.xml><?xml version="1.0" encoding="utf-8"?>
 <?mso-contentType ?>
 <FormTemplates xmlns="http://schemas.microsoft.com/sharepoint/v3/contenttype/forms">
   <Display>DocumentLibraryForm</Display>
   <Edit>DocumentLibraryForm</Edit>
   <New>DocumentLibraryForm</New>
 </FormTemplates>
-</file>
-
-<file path=customXml/item2.xml><?xml version="1.0" encoding="utf-8"?>
-<p:properties xmlns:p="http://schemas.microsoft.com/office/2006/metadata/properties" xmlns:xsi="http://www.w3.org/2001/XMLSchema-instance">
-  <documentManagement/>
-</p:properties>
 </file>
 
 <file path=customXml/item3.xml><?xml version="1.0" encoding="utf-8"?>
@@ -12555,17 +12663,17 @@
 </file>
 
 <file path=customXml/itemProps1.xml><?xml version="1.0" encoding="utf-8"?>
-<ds:datastoreItem xmlns:ds="http://schemas.openxmlformats.org/officeDocument/2006/customXml" ds:itemID="{AF2462E9-E3C6-4B9B-800D-1AA92DB6FEE6}">
+<ds:datastoreItem xmlns:ds="http://schemas.openxmlformats.org/officeDocument/2006/customXml" ds:itemID="{BC974159-165D-43A7-BAC0-2BE7E1872CAD}">
   <ds:schemaRefs>
-    <ds:schemaRef ds:uri="http://schemas.microsoft.com/sharepoint/v3/contenttype/forms"/>
+    <ds:schemaRef ds:uri="http://schemas.microsoft.com/office/2006/metadata/properties"/>
   </ds:schemaRefs>
 </ds:datastoreItem>
 </file>
 
 <file path=customXml/itemProps2.xml><?xml version="1.0" encoding="utf-8"?>
-<ds:datastoreItem xmlns:ds="http://schemas.openxmlformats.org/officeDocument/2006/customXml" ds:itemID="{BC974159-165D-43A7-BAC0-2BE7E1872CAD}">
+<ds:datastoreItem xmlns:ds="http://schemas.openxmlformats.org/officeDocument/2006/customXml" ds:itemID="{AF2462E9-E3C6-4B9B-800D-1AA92DB6FEE6}">
   <ds:schemaRefs>
-    <ds:schemaRef ds:uri="http://schemas.microsoft.com/office/2006/metadata/properties"/>
+    <ds:schemaRef ds:uri="http://schemas.microsoft.com/sharepoint/v3/contenttype/forms"/>
   </ds:schemaRefs>
 </ds:datastoreItem>
 </file>

</xml_diff>